<commit_message>
update to syllabus for wine dataset
</commit_message>
<xml_diff>
--- a/Presentations/AI Training Syllabus.pptx
+++ b/Presentations/AI Training Syllabus.pptx
@@ -201,7 +201,7 @@
           <a:p>
             <a:fld id="{FAF957FC-5175-49AC-8D2B-2F056FFFC1DD}" type="datetimeFigureOut">
               <a:rPr lang="en-US" smtClean="0"/>
-              <a:t>12/3/2017</a:t>
+              <a:t>12/11/2017</a:t>
             </a:fld>
             <a:endParaRPr lang="en-US"/>
           </a:p>
@@ -651,7 +651,7 @@
             <a:fld id="{1D8BD707-D9CF-40AE-B4C6-C98DA3205C09}" type="datetimeFigureOut">
               <a:rPr lang="en-US" smtClean="0"/>
               <a:pPr/>
-              <a:t>12/3/2017</a:t>
+              <a:t>12/11/2017</a:t>
             </a:fld>
             <a:endParaRPr lang="en-US"/>
           </a:p>
@@ -818,7 +818,7 @@
             <a:fld id="{1D8BD707-D9CF-40AE-B4C6-C98DA3205C09}" type="datetimeFigureOut">
               <a:rPr lang="en-US" smtClean="0"/>
               <a:pPr/>
-              <a:t>12/3/2017</a:t>
+              <a:t>12/11/2017</a:t>
             </a:fld>
             <a:endParaRPr lang="en-US"/>
           </a:p>
@@ -995,7 +995,7 @@
             <a:fld id="{1D8BD707-D9CF-40AE-B4C6-C98DA3205C09}" type="datetimeFigureOut">
               <a:rPr lang="en-US" smtClean="0"/>
               <a:pPr/>
-              <a:t>12/3/2017</a:t>
+              <a:t>12/11/2017</a:t>
             </a:fld>
             <a:endParaRPr lang="en-US"/>
           </a:p>
@@ -1162,7 +1162,7 @@
             <a:fld id="{1D8BD707-D9CF-40AE-B4C6-C98DA3205C09}" type="datetimeFigureOut">
               <a:rPr lang="en-US" smtClean="0"/>
               <a:pPr/>
-              <a:t>12/3/2017</a:t>
+              <a:t>12/11/2017</a:t>
             </a:fld>
             <a:endParaRPr lang="en-US"/>
           </a:p>
@@ -1405,7 +1405,7 @@
             <a:fld id="{1D8BD707-D9CF-40AE-B4C6-C98DA3205C09}" type="datetimeFigureOut">
               <a:rPr lang="en-US" smtClean="0"/>
               <a:pPr/>
-              <a:t>12/3/2017</a:t>
+              <a:t>12/11/2017</a:t>
             </a:fld>
             <a:endParaRPr lang="en-US"/>
           </a:p>
@@ -1690,7 +1690,7 @@
             <a:fld id="{1D8BD707-D9CF-40AE-B4C6-C98DA3205C09}" type="datetimeFigureOut">
               <a:rPr lang="en-US" smtClean="0"/>
               <a:pPr/>
-              <a:t>12/3/2017</a:t>
+              <a:t>12/11/2017</a:t>
             </a:fld>
             <a:endParaRPr lang="en-US"/>
           </a:p>
@@ -2109,7 +2109,7 @@
             <a:fld id="{1D8BD707-D9CF-40AE-B4C6-C98DA3205C09}" type="datetimeFigureOut">
               <a:rPr lang="en-US" smtClean="0"/>
               <a:pPr/>
-              <a:t>12/3/2017</a:t>
+              <a:t>12/11/2017</a:t>
             </a:fld>
             <a:endParaRPr lang="en-US"/>
           </a:p>
@@ -2224,7 +2224,7 @@
             <a:fld id="{1D8BD707-D9CF-40AE-B4C6-C98DA3205C09}" type="datetimeFigureOut">
               <a:rPr lang="en-US" smtClean="0"/>
               <a:pPr/>
-              <a:t>12/3/2017</a:t>
+              <a:t>12/11/2017</a:t>
             </a:fld>
             <a:endParaRPr lang="en-US"/>
           </a:p>
@@ -2316,7 +2316,7 @@
             <a:fld id="{1D8BD707-D9CF-40AE-B4C6-C98DA3205C09}" type="datetimeFigureOut">
               <a:rPr lang="en-US" smtClean="0"/>
               <a:pPr/>
-              <a:t>12/3/2017</a:t>
+              <a:t>12/11/2017</a:t>
             </a:fld>
             <a:endParaRPr lang="en-US"/>
           </a:p>
@@ -2590,7 +2590,7 @@
             <a:fld id="{1D8BD707-D9CF-40AE-B4C6-C98DA3205C09}" type="datetimeFigureOut">
               <a:rPr lang="en-US" smtClean="0"/>
               <a:pPr/>
-              <a:t>12/3/2017</a:t>
+              <a:t>12/11/2017</a:t>
             </a:fld>
             <a:endParaRPr lang="en-US"/>
           </a:p>
@@ -2840,7 +2840,7 @@
             <a:fld id="{1D8BD707-D9CF-40AE-B4C6-C98DA3205C09}" type="datetimeFigureOut">
               <a:rPr lang="en-US" smtClean="0"/>
               <a:pPr/>
-              <a:t>12/3/2017</a:t>
+              <a:t>12/11/2017</a:t>
             </a:fld>
             <a:endParaRPr lang="en-US"/>
           </a:p>
@@ -3050,7 +3050,7 @@
             <a:fld id="{1D8BD707-D9CF-40AE-B4C6-C98DA3205C09}" type="datetimeFigureOut">
               <a:rPr lang="en-US" smtClean="0"/>
               <a:pPr/>
-              <a:t>12/3/2017</a:t>
+              <a:t>12/11/2017</a:t>
             </a:fld>
             <a:endParaRPr lang="en-US"/>
           </a:p>
@@ -3873,11 +3873,7 @@
             </a:r>
             <a:r>
               <a:rPr lang="en-US" sz="1600" dirty="0" smtClean="0"/>
-              <a:t>analyzing and preparing datasets for machine </a:t>
-            </a:r>
-            <a:r>
-              <a:rPr lang="en-US" sz="1600" dirty="0" smtClean="0"/>
-              <a:t>learning. </a:t>
+              <a:t>analyzing and preparing datasets for machine learning. </a:t>
             </a:r>
             <a:r>
               <a:rPr lang="en-US" sz="1600" dirty="0"/>
@@ -3965,7 +3961,6 @@
               <a:rPr lang="en-US" sz="1600" dirty="0" smtClean="0"/>
               <a:t>. PhD)</a:t>
             </a:r>
-            <a:endParaRPr lang="en-US" sz="1600" dirty="0" smtClean="0"/>
           </a:p>
           <a:p>
             <a:endParaRPr lang="en-US" sz="2800" b="1" dirty="0" smtClean="0">
@@ -5305,17 +5300,7 @@
                   </a:schemeClr>
                 </a:solidFill>
               </a:rPr>
-              <a:t>Session </a:t>
-            </a:r>
-            <a:r>
-              <a:rPr lang="en-US" sz="2800" b="1" dirty="0" smtClean="0">
-                <a:solidFill>
-                  <a:schemeClr val="accent5">
-                    <a:lumMod val="75000"/>
-                  </a:schemeClr>
-                </a:solidFill>
-              </a:rPr>
-              <a:t>1: </a:t>
+              <a:t>Session 1: </a:t>
             </a:r>
             <a:r>
               <a:rPr lang="en-US" sz="2800" b="1" dirty="0" smtClean="0">
@@ -5350,11 +5335,7 @@
             </a:br>
             <a:r>
               <a:rPr lang="en-US" sz="1600" dirty="0" smtClean="0"/>
-              <a:t>	Greedy Algorithm, and A-STAR Algorithm</a:t>
-            </a:r>
-            <a:r>
-              <a:rPr lang="en-US" sz="1600" dirty="0" smtClean="0"/>
-              <a:t>.</a:t>
+              <a:t>	Greedy Algorithm, and A-STAR Algorithm.</a:t>
             </a:r>
           </a:p>
           <a:p>
@@ -5778,17 +5759,7 @@
                   </a:schemeClr>
                 </a:solidFill>
               </a:rPr>
-              <a:t>Session </a:t>
-            </a:r>
-            <a:r>
-              <a:rPr lang="en-US" sz="2800" b="1" dirty="0" smtClean="0">
-                <a:solidFill>
-                  <a:schemeClr val="accent5">
-                    <a:lumMod val="75000"/>
-                  </a:schemeClr>
-                </a:solidFill>
-              </a:rPr>
-              <a:t>3: </a:t>
+              <a:t>Session 3: </a:t>
             </a:r>
             <a:r>
               <a:rPr lang="en-US" sz="2800" b="1" dirty="0" smtClean="0">
@@ -6284,21 +6255,11 @@
                   </a:schemeClr>
                 </a:solidFill>
               </a:rPr>
-              <a:t>Session </a:t>
+              <a:t>Session 5: </a:t>
             </a:r>
             <a:r>
               <a:rPr lang="en-US" sz="2800" b="1" dirty="0" smtClean="0">
                 <a:solidFill>
-                  <a:schemeClr val="accent5">
-                    <a:lumMod val="75000"/>
-                  </a:schemeClr>
-                </a:solidFill>
-              </a:rPr>
-              <a:t>5: </a:t>
-            </a:r>
-            <a:r>
-              <a:rPr lang="en-US" sz="2800" b="1" dirty="0" smtClean="0">
-                <a:solidFill>
                   <a:srgbClr val="00B050"/>
                 </a:solidFill>
               </a:rPr>
@@ -6350,11 +6311,7 @@
             </a:br>
             <a:r>
               <a:rPr lang="en-US" sz="1600" dirty="0" smtClean="0"/>
-              <a:t>	and multiple linear regression, decision trees, ensemble methods and confusion matrices</a:t>
-            </a:r>
-            <a:r>
-              <a:rPr lang="en-US" sz="1600" dirty="0" smtClean="0"/>
-              <a:t>.</a:t>
+              <a:t>	and multiple linear regression, decision trees, ensemble methods and confusion matrices.</a:t>
             </a:r>
           </a:p>
           <a:p>
@@ -6592,7 +6549,7 @@
         <p:spPr>
           <a:xfrm>
             <a:off x="152400" y="1164134"/>
-            <a:ext cx="9000734" cy="5632311"/>
+            <a:ext cx="9000734" cy="5940088"/>
           </a:xfrm>
           <a:prstGeom prst="rect">
             <a:avLst/>
@@ -6617,17 +6574,7 @@
                   </a:schemeClr>
                 </a:solidFill>
               </a:rPr>
-              <a:t>Session </a:t>
-            </a:r>
-            <a:r>
-              <a:rPr lang="en-US" sz="2800" b="1" dirty="0" smtClean="0">
-                <a:solidFill>
-                  <a:schemeClr val="accent5">
-                    <a:lumMod val="75000"/>
-                  </a:schemeClr>
-                </a:solidFill>
-              </a:rPr>
-              <a:t>6: </a:t>
+              <a:t>Session 6: </a:t>
             </a:r>
             <a:r>
               <a:rPr lang="en-US" sz="2800" b="1" dirty="0">
@@ -6696,11 +6643,7 @@
             </a:br>
             <a:r>
               <a:rPr lang="en-US" sz="1600" dirty="0" smtClean="0"/>
-              <a:t>	Torch</a:t>
-            </a:r>
-            <a:r>
-              <a:rPr lang="en-US" sz="1600" dirty="0" smtClean="0"/>
-              <a:t>.</a:t>
+              <a:t>	Torch.</a:t>
             </a:r>
           </a:p>
           <a:p>
@@ -6767,37 +6710,59 @@
             </a:r>
             <a:r>
               <a:rPr lang="en-US" sz="1600" b="1" dirty="0" smtClean="0"/>
-              <a:t>		&lt;wine dataset&gt;</a:t>
-            </a:r>
-            <a:endParaRPr lang="en-US" sz="1600" b="1" dirty="0"/>
+              <a:t>	</a:t>
+            </a:r>
+            <a:r>
+              <a:rPr lang="en-US" sz="1600" b="1" smtClean="0"/>
+              <a:t>	</a:t>
+            </a:r>
+            <a:r>
+              <a:rPr lang="en-US" sz="1600">
+                <a:hlinkClick r:id="rId4"/>
+              </a:rPr>
+              <a:t>Wine Dataset: Random </a:t>
+            </a:r>
+            <a:r>
+              <a:rPr lang="en-US" sz="1600">
+                <a:hlinkClick r:id="rId4"/>
+              </a:rPr>
+              <a:t>Forest </a:t>
+            </a:r>
+            <a:r>
+              <a:rPr lang="en-US" sz="1600" smtClean="0">
+                <a:hlinkClick r:id="rId4"/>
+              </a:rPr>
+              <a:t>Classification</a:t>
+            </a:r>
+            <a:endParaRPr lang="en-US" sz="1600" smtClean="0"/>
           </a:p>
           <a:p>
             <a:r>
               <a:rPr lang="en-US" sz="1600" dirty="0" smtClean="0"/>
               <a:t>		</a:t>
-            </a:r>
-            <a:r>
-              <a:rPr lang="en-US" sz="1600" b="1" dirty="0">
-                <a:hlinkClick r:id="rId4"/>
-              </a:rPr>
-              <a:t>OOP Principles</a:t>
-            </a:r>
-            <a:endParaRPr lang="en-US" sz="1600" b="1" dirty="0"/>
-          </a:p>
-          <a:p>
-            <a:r>
-              <a:rPr lang="en-US" sz="1600" dirty="0" smtClean="0"/>
-              <a:t>		</a:t>
-            </a:r>
-            <a:r>
-              <a:rPr lang="en-US" sz="1600" b="1" dirty="0">
-                <a:hlinkClick r:id="rId5"/>
-              </a:rPr>
-              <a:t>Python OOP </a:t>
             </a:r>
             <a:r>
               <a:rPr lang="en-US" sz="1600" b="1" dirty="0" smtClean="0">
                 <a:hlinkClick r:id="rId5"/>
+              </a:rPr>
+              <a:t>OOP Principles</a:t>
+            </a:r>
+            <a:endParaRPr lang="en-US" sz="1600" b="1" dirty="0" smtClean="0"/>
+          </a:p>
+          <a:p>
+            <a:r>
+              <a:rPr lang="en-US" sz="1600" dirty="0" smtClean="0"/>
+              <a:t>		</a:t>
+            </a:r>
+            <a:r>
+              <a:rPr lang="en-US" sz="1600" b="1" dirty="0">
+                <a:hlinkClick r:id="rId6"/>
+              </a:rPr>
+              <a:t>Python OOP </a:t>
+            </a:r>
+            <a:r>
+              <a:rPr lang="en-US" sz="1600" b="1" dirty="0" smtClean="0">
+                <a:hlinkClick r:id="rId6"/>
               </a:rPr>
               <a:t>Programming</a:t>
             </a:r>
@@ -6814,7 +6779,7 @@
             </a:r>
             <a:r>
               <a:rPr lang="en-US" sz="1600" dirty="0">
-                <a:hlinkClick r:id="rId6"/>
+                <a:hlinkClick r:id="rId7"/>
               </a:rPr>
               <a:t>OOP for Machine Language Programming</a:t>
             </a:r>
@@ -6889,6 +6854,11 @@
               <a:rPr lang="en-US" sz="1600" dirty="0" smtClean="0"/>
               <a:t>.</a:t>
             </a:r>
+          </a:p>
+          <a:p>
+            <a:endParaRPr lang="en-US" sz="1600" dirty="0"/>
+          </a:p>
+          <a:p>
             <a:endParaRPr lang="en-US" sz="1600" dirty="0" smtClean="0"/>
           </a:p>
         </p:txBody>
@@ -7198,11 +7168,7 @@
             </a:r>
             <a:r>
               <a:rPr lang="en-US" sz="1600" dirty="0" smtClean="0"/>
-              <a:t>This workshop will cover </a:t>
-            </a:r>
-            <a:r>
-              <a:rPr lang="en-US" sz="1600" dirty="0" smtClean="0"/>
-              <a:t>machine learning programming in the </a:t>
+              <a:t>This workshop will cover machine learning programming in the </a:t>
             </a:r>
             <a:r>
               <a:rPr lang="en-US" sz="1600" dirty="0" err="1" smtClean="0"/>
@@ -7233,11 +7199,7 @@
             </a:r>
             <a:r>
               <a:rPr lang="en-US" sz="1600" dirty="0" smtClean="0"/>
-              <a:t>(</a:t>
-            </a:r>
-            <a:r>
-              <a:rPr lang="en-US" sz="1600" dirty="0" smtClean="0"/>
-              <a:t>Ernest </a:t>
+              <a:t>(Ernest </a:t>
             </a:r>
             <a:r>
               <a:rPr lang="en-US" sz="1600" dirty="0" err="1" smtClean="0"/>

</xml_diff>

<commit_message>
update to syllabus for NLP
</commit_message>
<xml_diff>
--- a/Presentations/AI Training Syllabus.pptx
+++ b/Presentations/AI Training Syllabus.pptx
@@ -5,7 +5,7 @@
     <p:sldMasterId id="2147483648" r:id="rId1"/>
   </p:sldMasterIdLst>
   <p:notesMasterIdLst>
-    <p:notesMasterId r:id="rId12"/>
+    <p:notesMasterId r:id="rId13"/>
   </p:notesMasterIdLst>
   <p:sldIdLst>
     <p:sldId id="256" r:id="rId2"/>
@@ -16,8 +16,9 @@
     <p:sldId id="289" r:id="rId7"/>
     <p:sldId id="284" r:id="rId8"/>
     <p:sldId id="285" r:id="rId9"/>
-    <p:sldId id="286" r:id="rId10"/>
-    <p:sldId id="287" r:id="rId11"/>
+    <p:sldId id="290" r:id="rId10"/>
+    <p:sldId id="286" r:id="rId11"/>
+    <p:sldId id="287" r:id="rId12"/>
   </p:sldIdLst>
   <p:sldSz cx="9144000" cy="6858000" type="screen4x3"/>
   <p:notesSz cx="6858000" cy="9144000"/>
@@ -3802,6 +3803,333 @@
         <p:spPr>
           <a:xfrm>
             <a:off x="152400" y="1164134"/>
+            <a:ext cx="9029395" cy="3023905"/>
+          </a:xfrm>
+          <a:prstGeom prst="rect">
+            <a:avLst/>
+          </a:prstGeom>
+          <a:noFill/>
+        </p:spPr>
+        <p:txBody>
+          <a:bodyPr wrap="none" rtlCol="0">
+            <a:spAutoFit/>
+          </a:bodyPr>
+          <a:lstStyle/>
+          <a:p>
+            <a:endParaRPr lang="en-US" sz="1050" b="1" dirty="0">
+              <a:solidFill>
+                <a:srgbClr val="00B050"/>
+              </a:solidFill>
+            </a:endParaRPr>
+          </a:p>
+          <a:p>
+            <a:pPr marL="285750" indent="-285750">
+              <a:buFont typeface="Arial" panose="020B0604020202020204" pitchFamily="34" charset="0"/>
+              <a:buChar char="•"/>
+            </a:pPr>
+            <a:r>
+              <a:rPr lang="en-US" sz="2800" b="1" dirty="0">
+                <a:solidFill>
+                  <a:schemeClr val="accent5">
+                    <a:lumMod val="75000"/>
+                  </a:schemeClr>
+                </a:solidFill>
+              </a:rPr>
+              <a:t>Session </a:t>
+            </a:r>
+            <a:r>
+              <a:rPr lang="en-US" sz="2800" b="1" dirty="0" smtClean="0">
+                <a:solidFill>
+                  <a:schemeClr val="accent5">
+                    <a:lumMod val="75000"/>
+                  </a:schemeClr>
+                </a:solidFill>
+              </a:rPr>
+              <a:t>9: </a:t>
+            </a:r>
+            <a:r>
+              <a:rPr lang="en-US" sz="2800" b="1" dirty="0" smtClean="0">
+                <a:solidFill>
+                  <a:srgbClr val="00B050"/>
+                </a:solidFill>
+              </a:rPr>
+              <a:t>Workshop – </a:t>
+            </a:r>
+            <a:r>
+              <a:rPr lang="en-US" sz="2800" b="1" dirty="0" err="1" smtClean="0">
+                <a:solidFill>
+                  <a:srgbClr val="00B050"/>
+                </a:solidFill>
+              </a:rPr>
+              <a:t>PyCharm</a:t>
+            </a:r>
+            <a:r>
+              <a:rPr lang="en-US" sz="2800" b="1" dirty="0" smtClean="0">
+                <a:solidFill>
+                  <a:srgbClr val="00B050"/>
+                </a:solidFill>
+              </a:rPr>
+              <a:t>/</a:t>
+            </a:r>
+            <a:r>
+              <a:rPr lang="en-US" sz="2800" b="1" dirty="0" err="1" smtClean="0">
+                <a:solidFill>
+                  <a:srgbClr val="00B050"/>
+                </a:solidFill>
+              </a:rPr>
+              <a:t>PyTorch</a:t>
+            </a:r>
+            <a:endParaRPr lang="en-US" sz="2800" b="1" dirty="0" smtClean="0">
+              <a:solidFill>
+                <a:srgbClr val="00B050"/>
+              </a:solidFill>
+            </a:endParaRPr>
+          </a:p>
+          <a:p>
+            <a:endParaRPr lang="en-US" sz="1600" dirty="0"/>
+          </a:p>
+          <a:p>
+            <a:r>
+              <a:rPr lang="en-US" sz="1600" dirty="0"/>
+              <a:t>	</a:t>
+            </a:r>
+            <a:r>
+              <a:rPr lang="en-US" sz="1600" dirty="0" smtClean="0"/>
+              <a:t>This workshop will cover machine learning programming in the </a:t>
+            </a:r>
+            <a:r>
+              <a:rPr lang="en-US" sz="1600" dirty="0" err="1" smtClean="0"/>
+              <a:t>PyCharm</a:t>
+            </a:r>
+            <a:r>
+              <a:rPr lang="en-US" sz="1600" dirty="0" smtClean="0"/>
+              <a:t> IDE with the </a:t>
+            </a:r>
+            <a:r>
+              <a:rPr lang="en-US" sz="1600" dirty="0" err="1" smtClean="0"/>
+              <a:t>PyTorch</a:t>
+            </a:r>
+            <a:endParaRPr lang="en-US" sz="1600" dirty="0" smtClean="0"/>
+          </a:p>
+          <a:p>
+            <a:r>
+              <a:rPr lang="en-US" sz="1600" dirty="0"/>
+              <a:t>	</a:t>
+            </a:r>
+            <a:r>
+              <a:rPr lang="en-US" sz="1600" dirty="0" smtClean="0"/>
+              <a:t>machine learning framework.</a:t>
+            </a:r>
+            <a:r>
+              <a:rPr lang="en-US" sz="1600" dirty="0"/>
+              <a:t> </a:t>
+            </a:r>
+            <a:r>
+              <a:rPr lang="en-US" sz="1600" dirty="0" smtClean="0"/>
+              <a:t>(Ernest </a:t>
+            </a:r>
+            <a:r>
+              <a:rPr lang="en-US" sz="1600" dirty="0" err="1" smtClean="0"/>
+              <a:t>Bonat</a:t>
+            </a:r>
+            <a:r>
+              <a:rPr lang="en-US" sz="1600" dirty="0" smtClean="0"/>
+              <a:t>, PhD).</a:t>
+            </a:r>
+          </a:p>
+          <a:p>
+            <a:endParaRPr lang="en-US" sz="1600" b="1" dirty="0" smtClean="0">
+              <a:solidFill>
+                <a:srgbClr val="00B050"/>
+              </a:solidFill>
+            </a:endParaRPr>
+          </a:p>
+          <a:p>
+            <a:pPr marL="285750" indent="-285750">
+              <a:buFont typeface="Arial" panose="020B0604020202020204" pitchFamily="34" charset="0"/>
+              <a:buChar char="•"/>
+            </a:pPr>
+            <a:r>
+              <a:rPr lang="en-US" sz="2800" b="1" dirty="0" smtClean="0">
+                <a:solidFill>
+                  <a:schemeClr val="accent5">
+                    <a:lumMod val="75000"/>
+                  </a:schemeClr>
+                </a:solidFill>
+              </a:rPr>
+              <a:t>Session 10: </a:t>
+            </a:r>
+            <a:r>
+              <a:rPr lang="en-US" sz="2800" b="1" dirty="0" smtClean="0">
+                <a:solidFill>
+                  <a:srgbClr val="00B050"/>
+                </a:solidFill>
+              </a:rPr>
+              <a:t>Workshop – </a:t>
+            </a:r>
+            <a:r>
+              <a:rPr lang="en-US" sz="2800" b="1" dirty="0" err="1" smtClean="0">
+                <a:solidFill>
+                  <a:srgbClr val="00B050"/>
+                </a:solidFill>
+              </a:rPr>
+              <a:t>TensorFlow</a:t>
+            </a:r>
+            <a:endParaRPr lang="en-US" sz="2800" b="1" dirty="0" smtClean="0">
+              <a:solidFill>
+                <a:srgbClr val="00B050"/>
+              </a:solidFill>
+            </a:endParaRPr>
+          </a:p>
+          <a:p>
+            <a:endParaRPr lang="en-US" sz="2800" dirty="0"/>
+          </a:p>
+          <a:p>
+            <a:r>
+              <a:rPr lang="en-US" sz="1600" dirty="0"/>
+              <a:t>	This workshop will cover programming in </a:t>
+            </a:r>
+            <a:r>
+              <a:rPr lang="en-US" sz="1600" dirty="0" err="1" smtClean="0"/>
+              <a:t>TensorFlow</a:t>
+            </a:r>
+            <a:r>
+              <a:rPr lang="en-US" sz="1600" dirty="0" smtClean="0"/>
+              <a:t>, covering the concepts of Design and Run,</a:t>
+            </a:r>
+          </a:p>
+          <a:p>
+            <a:r>
+              <a:rPr lang="en-US" sz="1600" dirty="0"/>
+              <a:t>	</a:t>
+            </a:r>
+            <a:r>
+              <a:rPr lang="en-US" sz="1600" dirty="0" smtClean="0"/>
+              <a:t>syntax, and common approaches and design techniques. (Julio Barros, MS)</a:t>
+            </a:r>
+          </a:p>
+        </p:txBody>
+      </p:sp>
+    </p:spTree>
+    <p:extLst>
+      <p:ext uri="{BB962C8B-B14F-4D97-AF65-F5344CB8AC3E}">
+        <p14:creationId xmlns:p14="http://schemas.microsoft.com/office/powerpoint/2010/main" val="2047582178"/>
+      </p:ext>
+    </p:extLst>
+  </p:cSld>
+  <p:clrMapOvr>
+    <a:masterClrMapping/>
+  </p:clrMapOvr>
+  <p:timing>
+    <p:tnLst>
+      <p:par>
+        <p:cTn id="1" dur="indefinite" restart="never" nodeType="tmRoot"/>
+      </p:par>
+    </p:tnLst>
+  </p:timing>
+</p:sld>
+</file>
+
+<file path=ppt/slides/slide11.xml><?xml version="1.0" encoding="utf-8"?>
+<p:sld xmlns:a="http://schemas.openxmlformats.org/drawingml/2006/main" xmlns:r="http://schemas.openxmlformats.org/officeDocument/2006/relationships" xmlns:p="http://schemas.openxmlformats.org/presentationml/2006/main">
+  <p:cSld>
+    <p:spTree>
+      <p:nvGrpSpPr>
+        <p:cNvPr id="1" name=""/>
+        <p:cNvGrpSpPr/>
+        <p:nvPr/>
+      </p:nvGrpSpPr>
+      <p:grpSpPr>
+        <a:xfrm>
+          <a:off x="0" y="0"/>
+          <a:ext cx="0" cy="0"/>
+          <a:chOff x="0" y="0"/>
+          <a:chExt cx="0" cy="0"/>
+        </a:xfrm>
+      </p:grpSpPr>
+      <p:sp>
+        <p:nvSpPr>
+          <p:cNvPr id="2" name="Title 1"/>
+          <p:cNvSpPr>
+            <a:spLocks noGrp="1"/>
+          </p:cNvSpPr>
+          <p:nvPr>
+            <p:ph type="title"/>
+          </p:nvPr>
+        </p:nvSpPr>
+        <p:spPr>
+          <a:xfrm>
+            <a:off x="457200" y="274638"/>
+            <a:ext cx="8305800" cy="792162"/>
+          </a:xfrm>
+        </p:spPr>
+        <p:txBody>
+          <a:bodyPr>
+            <a:normAutofit/>
+          </a:bodyPr>
+          <a:lstStyle/>
+          <a:p>
+            <a:pPr algn="l"/>
+            <a:r>
+              <a:rPr lang="en-US" dirty="0" smtClean="0">
+                <a:solidFill>
+                  <a:schemeClr val="accent1">
+                    <a:lumMod val="75000"/>
+                  </a:schemeClr>
+                </a:solidFill>
+              </a:rPr>
+              <a:t>Syllabus</a:t>
+            </a:r>
+            <a:endParaRPr lang="en-US" dirty="0">
+              <a:solidFill>
+                <a:schemeClr val="accent1">
+                  <a:lumMod val="75000"/>
+                </a:schemeClr>
+              </a:solidFill>
+            </a:endParaRPr>
+          </a:p>
+        </p:txBody>
+      </p:sp>
+      <p:cxnSp>
+        <p:nvCxnSpPr>
+          <p:cNvPr id="5" name="Straight Connector 4"/>
+          <p:cNvCxnSpPr/>
+          <p:nvPr/>
+        </p:nvCxnSpPr>
+        <p:spPr>
+          <a:xfrm>
+            <a:off x="0" y="990600"/>
+            <a:ext cx="9144000" cy="0"/>
+          </a:xfrm>
+          <a:prstGeom prst="line">
+            <a:avLst/>
+          </a:prstGeom>
+          <a:ln w="19050"/>
+        </p:spPr>
+        <p:style>
+          <a:lnRef idx="1">
+            <a:schemeClr val="accent1"/>
+          </a:lnRef>
+          <a:fillRef idx="0">
+            <a:schemeClr val="accent1"/>
+          </a:fillRef>
+          <a:effectRef idx="0">
+            <a:schemeClr val="accent1"/>
+          </a:effectRef>
+          <a:fontRef idx="minor">
+            <a:schemeClr val="tx1"/>
+          </a:fontRef>
+        </p:style>
+      </p:cxnSp>
+      <p:sp>
+        <p:nvSpPr>
+          <p:cNvPr id="36" name="TextBox 35"/>
+          <p:cNvSpPr txBox="1"/>
+          <p:nvPr/>
+        </p:nvSpPr>
+        <p:spPr>
+          <a:xfrm>
+            <a:off x="152400" y="1164134"/>
             <a:ext cx="8825173" cy="5509200"/>
           </a:xfrm>
           <a:prstGeom prst="rect">
@@ -6549,7 +6877,7 @@
         <p:spPr>
           <a:xfrm>
             <a:off x="152400" y="1164134"/>
-            <a:ext cx="9000734" cy="5940088"/>
+            <a:ext cx="9000734" cy="3908762"/>
           </a:xfrm>
           <a:prstGeom prst="rect">
             <a:avLst/>
@@ -6710,31 +7038,21 @@
             </a:r>
             <a:r>
               <a:rPr lang="en-US" sz="1600" b="1" dirty="0" smtClean="0"/>
-              <a:t>	</a:t>
-            </a:r>
-            <a:r>
-              <a:rPr lang="en-US" sz="1600" b="1" smtClean="0"/>
-              <a:t>	</a:t>
-            </a:r>
-            <a:r>
-              <a:rPr lang="en-US" sz="1600">
+              <a:t>		</a:t>
+            </a:r>
+            <a:r>
+              <a:rPr lang="en-US" sz="1600" dirty="0">
                 <a:hlinkClick r:id="rId4"/>
               </a:rPr>
-              <a:t>Wine Dataset: Random </a:t>
-            </a:r>
-            <a:r>
-              <a:rPr lang="en-US" sz="1600">
+              <a:t>Wine Dataset: Random Forest </a:t>
+            </a:r>
+            <a:r>
+              <a:rPr lang="en-US" sz="1600" dirty="0" smtClean="0">
                 <a:hlinkClick r:id="rId4"/>
               </a:rPr>
-              <a:t>Forest </a:t>
-            </a:r>
-            <a:r>
-              <a:rPr lang="en-US" sz="1600" smtClean="0">
-                <a:hlinkClick r:id="rId4"/>
-              </a:rPr>
               <a:t>Classification</a:t>
             </a:r>
-            <a:endParaRPr lang="en-US" sz="1600" smtClean="0"/>
+            <a:endParaRPr lang="en-US" sz="1600" dirty="0" smtClean="0"/>
           </a:p>
           <a:p>
             <a:r>
@@ -6781,81 +7099,14 @@
               <a:rPr lang="en-US" sz="1600" dirty="0">
                 <a:hlinkClick r:id="rId7"/>
               </a:rPr>
-              <a:t>OOP for Machine Language Programming</a:t>
-            </a:r>
-            <a:endParaRPr lang="en-US" sz="1200" dirty="0"/>
-          </a:p>
-          <a:p>
-            <a:endParaRPr lang="en-US" sz="1200" b="1" dirty="0" smtClean="0">
-              <a:solidFill>
-                <a:srgbClr val="00B050"/>
-              </a:solidFill>
-            </a:endParaRPr>
-          </a:p>
-          <a:p>
-            <a:pPr marL="285750" indent="-285750">
-              <a:buFont typeface="Arial" panose="020B0604020202020204" pitchFamily="34" charset="0"/>
-              <a:buChar char="•"/>
-            </a:pPr>
-            <a:r>
-              <a:rPr lang="en-US" sz="2800" b="1" dirty="0" smtClean="0">
-                <a:solidFill>
-                  <a:schemeClr val="accent5">
-                    <a:lumMod val="75000"/>
-                  </a:schemeClr>
-                </a:solidFill>
-              </a:rPr>
-              <a:t>Session 7: </a:t>
-            </a:r>
-            <a:r>
-              <a:rPr lang="en-US" sz="2800" b="1" dirty="0" smtClean="0">
-                <a:solidFill>
-                  <a:srgbClr val="00B050"/>
-                </a:solidFill>
-              </a:rPr>
-              <a:t>Natural Language Processing</a:t>
-            </a:r>
-          </a:p>
-          <a:p>
-            <a:endParaRPr lang="en-US" sz="2800" b="1" dirty="0">
-              <a:solidFill>
-                <a:srgbClr val="00B050"/>
-              </a:solidFill>
-            </a:endParaRPr>
-          </a:p>
-          <a:p>
-            <a:r>
-              <a:rPr lang="en-US" sz="1600" dirty="0" smtClean="0"/>
-              <a:t>	This session will cover the basic foundations of Natural Language Processing covering bags of </a:t>
-            </a:r>
-            <a:br>
-              <a:rPr lang="en-US" sz="1600" dirty="0" smtClean="0"/>
-            </a:br>
-            <a:r>
-              <a:rPr lang="en-US" sz="1600" dirty="0" smtClean="0"/>
-              <a:t>	words, cleaning, stemming, lemmatization, tern frequencies (TF), </a:t>
-            </a:r>
-            <a:r>
-              <a:rPr lang="en-US" sz="1600" dirty="0" err="1" smtClean="0"/>
-              <a:t>interdocument</a:t>
-            </a:r>
-            <a:r>
-              <a:rPr lang="en-US" sz="1600" dirty="0" smtClean="0"/>
-              <a:t> frequencies </a:t>
-            </a:r>
-            <a:br>
-              <a:rPr lang="en-US" sz="1600" dirty="0" smtClean="0"/>
-            </a:br>
-            <a:r>
-              <a:rPr lang="en-US" sz="1600" dirty="0" smtClean="0"/>
-              <a:t>	(IDF), handling narrative (text) fields in datasets, and word vectors</a:t>
-            </a:r>
-            <a:r>
-              <a:rPr lang="en-US" sz="1600" dirty="0" smtClean="0"/>
-              <a:t>.</a:t>
-            </a:r>
-          </a:p>
-          <a:p>
+              <a:t>OOP for Machine Language </a:t>
+            </a:r>
+            <a:r>
+              <a:rPr lang="en-US" sz="1600" dirty="0" smtClean="0">
+                <a:hlinkClick r:id="rId7"/>
+              </a:rPr>
+              <a:t>Programming</a:t>
+            </a:r>
             <a:endParaRPr lang="en-US" sz="1600" dirty="0"/>
           </a:p>
           <a:p>
@@ -6983,7 +7234,7 @@
         <p:spPr>
           <a:xfrm>
             <a:off x="152400" y="1164134"/>
-            <a:ext cx="9029395" cy="5093702"/>
+            <a:ext cx="8923212" cy="5262979"/>
           </a:xfrm>
           <a:prstGeom prst="rect">
             <a:avLst/>
@@ -6996,7 +7247,7 @@
           </a:bodyPr>
           <a:lstStyle/>
           <a:p>
-            <a:endParaRPr lang="en-US" sz="1050" b="1" dirty="0">
+            <a:endParaRPr lang="en-US" sz="1200" b="1" dirty="0" smtClean="0">
               <a:solidFill>
                 <a:srgbClr val="00B050"/>
               </a:solidFill>
@@ -7008,33 +7259,25 @@
               <a:buChar char="•"/>
             </a:pPr>
             <a:r>
-              <a:rPr lang="en-US" sz="2800" b="1" dirty="0">
+              <a:rPr lang="en-US" sz="2800" b="1" dirty="0" smtClean="0">
                 <a:solidFill>
                   <a:schemeClr val="accent5">
                     <a:lumMod val="75000"/>
                   </a:schemeClr>
                 </a:solidFill>
               </a:rPr>
-              <a:t>Session </a:t>
+              <a:t>Session 7: </a:t>
             </a:r>
             <a:r>
               <a:rPr lang="en-US" sz="2800" b="1" dirty="0" smtClean="0">
                 <a:solidFill>
-                  <a:schemeClr val="accent5">
-                    <a:lumMod val="75000"/>
-                  </a:schemeClr>
-                </a:solidFill>
-              </a:rPr>
-              <a:t>8: </a:t>
-            </a:r>
-            <a:r>
-              <a:rPr lang="en-US" sz="2800" b="1" dirty="0" smtClean="0">
-                <a:solidFill>
                   <a:srgbClr val="00B050"/>
                 </a:solidFill>
               </a:rPr>
-              <a:t>Sensor Fusion</a:t>
-            </a:r>
+              <a:t>Natural Language Processing</a:t>
+            </a:r>
+          </a:p>
+          <a:p>
             <a:endParaRPr lang="en-US" sz="2800" b="1" dirty="0">
               <a:solidFill>
                 <a:srgbClr val="00B050"/>
@@ -7042,6 +7285,46 @@
             </a:endParaRPr>
           </a:p>
           <a:p>
+            <a:r>
+              <a:rPr lang="en-US" sz="1600" dirty="0" smtClean="0"/>
+              <a:t>	This session will cover the basic foundations of Natural Language Processing covering bags of </a:t>
+            </a:r>
+            <a:br>
+              <a:rPr lang="en-US" sz="1600" dirty="0" smtClean="0"/>
+            </a:br>
+            <a:r>
+              <a:rPr lang="en-US" sz="1600" dirty="0" smtClean="0"/>
+              <a:t>	words, cleaning, stemming, lemmatization, </a:t>
+            </a:r>
+            <a:r>
+              <a:rPr lang="en-US" sz="1600" dirty="0" smtClean="0"/>
+              <a:t>term </a:t>
+            </a:r>
+            <a:r>
+              <a:rPr lang="en-US" sz="1600" dirty="0" smtClean="0"/>
+              <a:t>frequencies (TF), </a:t>
+            </a:r>
+            <a:r>
+              <a:rPr lang="en-US" sz="1600" dirty="0" err="1" smtClean="0"/>
+              <a:t>interdocument</a:t>
+            </a:r>
+            <a:r>
+              <a:rPr lang="en-US" sz="1600" dirty="0" smtClean="0"/>
+              <a:t> frequencies </a:t>
+            </a:r>
+            <a:br>
+              <a:rPr lang="en-US" sz="1600" dirty="0" smtClean="0"/>
+            </a:br>
+            <a:r>
+              <a:rPr lang="en-US" sz="1600" dirty="0" smtClean="0"/>
+              <a:t>	(IDF), handling narrative (text) fields in datasets, and word vectors</a:t>
+            </a:r>
+            <a:r>
+              <a:rPr lang="en-US" sz="1600" dirty="0" smtClean="0"/>
+              <a:t>.</a:t>
+            </a:r>
+          </a:p>
+          <a:p>
             <a:endParaRPr lang="en-US" sz="1600" dirty="0" smtClean="0"/>
           </a:p>
           <a:p>
@@ -7051,49 +7334,64 @@
             </a:r>
             <a:r>
               <a:rPr lang="en-US" sz="1600" dirty="0" smtClean="0"/>
-              <a:t>The first part of this </a:t>
-            </a:r>
-            <a:r>
-              <a:rPr lang="en-US" sz="1600" dirty="0"/>
-              <a:t>session will cover the basic </a:t>
-            </a:r>
-            <a:r>
-              <a:rPr lang="en-US" sz="1600" dirty="0" smtClean="0"/>
-              <a:t>foundations of sensor technology in the </a:t>
-            </a:r>
-            <a:br>
-              <a:rPr lang="en-US" sz="1600" dirty="0" smtClean="0"/>
-            </a:br>
-            <a:r>
-              <a:rPr lang="en-US" sz="1600" dirty="0" smtClean="0"/>
-              <a:t>	autonomous world, covering GPS, cameras, IDAR, and sonic sensors.</a:t>
-            </a:r>
-          </a:p>
-          <a:p>
-            <a:endParaRPr lang="en-US" sz="1600" dirty="0"/>
-          </a:p>
-          <a:p>
-            <a:r>
-              <a:rPr lang="en-US" sz="1600" dirty="0" smtClean="0"/>
-              <a:t>	The second part of this session will cover the algorithms, covering sensor fusion, SLAM and</a:t>
-            </a:r>
-          </a:p>
-          <a:p>
+              <a:t>	</a:t>
+            </a:r>
+            <a:r>
+              <a:rPr lang="en-US" sz="1600" b="1" dirty="0">
+                <a:hlinkClick r:id="rId2"/>
+              </a:rPr>
+              <a:t>Introduction to Natural Language Processing</a:t>
+            </a:r>
+            <a:endParaRPr lang="en-US" sz="1600" b="1" dirty="0"/>
+          </a:p>
+          <a:p>
+            <a:r>
+              <a:rPr lang="en-US" sz="1600" dirty="0" smtClean="0"/>
+              <a:t>	</a:t>
+            </a:r>
             <a:r>
               <a:rPr lang="en-US" sz="1600" dirty="0"/>
               <a:t>	</a:t>
             </a:r>
             <a:r>
-              <a:rPr lang="en-US" sz="1600" dirty="0" smtClean="0"/>
-              <a:t>computer vision.</a:t>
-            </a:r>
-          </a:p>
-          <a:p>
-            <a:endParaRPr lang="en-US" sz="1050" b="1" dirty="0">
-              <a:solidFill>
-                <a:srgbClr val="00B050"/>
-              </a:solidFill>
-            </a:endParaRPr>
+              <a:rPr lang="en-US" sz="1600" b="1" dirty="0" smtClean="0">
+                <a:hlinkClick r:id="rId3"/>
+              </a:rPr>
+              <a:t>Handling </a:t>
+            </a:r>
+            <a:r>
+              <a:rPr lang="en-US" sz="1600" b="1" dirty="0">
+                <a:hlinkClick r:id="rId3"/>
+              </a:rPr>
+              <a:t>Narrative Fields in Datasets for </a:t>
+            </a:r>
+            <a:r>
+              <a:rPr lang="en-US" sz="1600" b="1" dirty="0" smtClean="0">
+                <a:hlinkClick r:id="rId3"/>
+              </a:rPr>
+              <a:t>Classification</a:t>
+            </a:r>
+            <a:endParaRPr lang="en-US" sz="1600" b="1" dirty="0" smtClean="0"/>
+          </a:p>
+          <a:p>
+            <a:r>
+              <a:rPr lang="en-US" sz="1600" b="1" dirty="0"/>
+              <a:t>	</a:t>
+            </a:r>
+            <a:r>
+              <a:rPr lang="en-US" sz="1600" b="1" dirty="0" smtClean="0"/>
+              <a:t>	</a:t>
+            </a:r>
+            <a:r>
+              <a:rPr lang="en-US" sz="1600" b="1" dirty="0">
+                <a:hlinkClick r:id="rId4"/>
+              </a:rPr>
+              <a:t>Groupings (Associations) Generation</a:t>
+            </a:r>
+            <a:endParaRPr lang="en-US" sz="1600" b="1" dirty="0"/>
+          </a:p>
+          <a:p>
+            <a:endParaRPr lang="en-US" sz="1600" b="1" dirty="0"/>
           </a:p>
           <a:p>
             <a:pPr marL="285750" indent="-285750">
@@ -7108,55 +7406,16 @@
                   </a:schemeClr>
                 </a:solidFill>
               </a:rPr>
-              <a:t>Session </a:t>
-            </a:r>
-            <a:r>
-              <a:rPr lang="en-US" sz="2800" b="1" dirty="0" smtClean="0">
-                <a:solidFill>
-                  <a:schemeClr val="accent5">
-                    <a:lumMod val="75000"/>
-                  </a:schemeClr>
-                </a:solidFill>
-              </a:rPr>
-              <a:t>9: </a:t>
-            </a:r>
-            <a:r>
-              <a:rPr lang="en-US" sz="2800" b="1" dirty="0" smtClean="0">
+              <a:t>Session 8: </a:t>
+            </a:r>
+            <a:r>
+              <a:rPr lang="en-US" sz="2800" b="1" dirty="0">
                 <a:solidFill>
                   <a:srgbClr val="00B050"/>
                 </a:solidFill>
               </a:rPr>
-              <a:t>Workshop – </a:t>
-            </a:r>
-            <a:r>
-              <a:rPr lang="en-US" sz="2800" b="1" dirty="0" err="1" smtClean="0">
-                <a:solidFill>
-                  <a:srgbClr val="00B050"/>
-                </a:solidFill>
-              </a:rPr>
-              <a:t>PyCharm</a:t>
-            </a:r>
-            <a:r>
-              <a:rPr lang="en-US" sz="2800" b="1" dirty="0" smtClean="0">
-                <a:solidFill>
-                  <a:srgbClr val="00B050"/>
-                </a:solidFill>
-              </a:rPr>
-              <a:t>/</a:t>
-            </a:r>
-            <a:r>
-              <a:rPr lang="en-US" sz="2800" b="1" dirty="0" err="1" smtClean="0">
-                <a:solidFill>
-                  <a:srgbClr val="00B050"/>
-                </a:solidFill>
-              </a:rPr>
-              <a:t>PyTorch</a:t>
-            </a:r>
-            <a:endParaRPr lang="en-US" sz="2800" b="1" dirty="0" smtClean="0">
-              <a:solidFill>
-                <a:srgbClr val="00B050"/>
-              </a:solidFill>
-            </a:endParaRPr>
+              <a:t>Sensor Fusion</a:t>
+            </a:r>
           </a:p>
           <a:p>
             <a:endParaRPr lang="en-US" sz="1600" dirty="0"/>
@@ -7164,129 +7423,44 @@
           <a:p>
             <a:r>
               <a:rPr lang="en-US" sz="1600" dirty="0"/>
-              <a:t>	</a:t>
-            </a:r>
-            <a:r>
-              <a:rPr lang="en-US" sz="1600" dirty="0" smtClean="0"/>
-              <a:t>This workshop will cover machine learning programming in the </a:t>
-            </a:r>
-            <a:r>
-              <a:rPr lang="en-US" sz="1600" dirty="0" err="1" smtClean="0"/>
-              <a:t>PyCharm</a:t>
-            </a:r>
-            <a:r>
-              <a:rPr lang="en-US" sz="1600" dirty="0" smtClean="0"/>
-              <a:t> IDE with the </a:t>
-            </a:r>
-            <a:r>
-              <a:rPr lang="en-US" sz="1600" dirty="0" err="1" smtClean="0"/>
-              <a:t>PyTorch</a:t>
-            </a:r>
+              <a:t>	The first part of this session will cover the basic foundations of sensor technology in the </a:t>
+            </a:r>
+            <a:br>
+              <a:rPr lang="en-US" sz="1600" dirty="0"/>
+            </a:br>
+            <a:r>
+              <a:rPr lang="en-US" sz="1600" dirty="0"/>
+              <a:t>	autonomous world, covering GPS, cameras, IDAR, and sonic sensors.</a:t>
+            </a:r>
+          </a:p>
+          <a:p>
+            <a:endParaRPr lang="en-US" sz="1600" dirty="0"/>
+          </a:p>
+          <a:p>
+            <a:r>
+              <a:rPr lang="en-US" sz="1600" dirty="0"/>
+              <a:t>	The second part of this session will cover the algorithms, covering sensor fusion, SLAM and</a:t>
+            </a:r>
+          </a:p>
+          <a:p>
+            <a:r>
+              <a:rPr lang="en-US" sz="1600" dirty="0"/>
+              <a:t>	computer vision</a:t>
+            </a:r>
+            <a:r>
+              <a:rPr lang="en-US" sz="1600" dirty="0" smtClean="0"/>
+              <a:t>.</a:t>
+            </a:r>
+          </a:p>
+          <a:p>
             <a:endParaRPr lang="en-US" sz="1600" dirty="0" smtClean="0"/>
-          </a:p>
-          <a:p>
-            <a:r>
-              <a:rPr lang="en-US" sz="1600" dirty="0"/>
-              <a:t>	</a:t>
-            </a:r>
-            <a:r>
-              <a:rPr lang="en-US" sz="1600" dirty="0" smtClean="0"/>
-              <a:t>machine learning framework.</a:t>
-            </a:r>
-            <a:r>
-              <a:rPr lang="en-US" sz="1600" dirty="0"/>
-              <a:t> </a:t>
-            </a:r>
-            <a:r>
-              <a:rPr lang="en-US" sz="1600" dirty="0" smtClean="0"/>
-              <a:t>(Ernest </a:t>
-            </a:r>
-            <a:r>
-              <a:rPr lang="en-US" sz="1600" dirty="0" err="1" smtClean="0"/>
-              <a:t>Bonat</a:t>
-            </a:r>
-            <a:r>
-              <a:rPr lang="en-US" sz="1600" dirty="0" smtClean="0"/>
-              <a:t>, PhD).</a:t>
-            </a:r>
-          </a:p>
-          <a:p>
-            <a:endParaRPr lang="en-US" sz="1600" b="1" dirty="0" smtClean="0">
-              <a:solidFill>
-                <a:srgbClr val="00B050"/>
-              </a:solidFill>
-            </a:endParaRPr>
-          </a:p>
-          <a:p>
-            <a:pPr marL="285750" indent="-285750">
-              <a:buFont typeface="Arial" panose="020B0604020202020204" pitchFamily="34" charset="0"/>
-              <a:buChar char="•"/>
-            </a:pPr>
-            <a:r>
-              <a:rPr lang="en-US" sz="2800" b="1" dirty="0" smtClean="0">
-                <a:solidFill>
-                  <a:schemeClr val="accent5">
-                    <a:lumMod val="75000"/>
-                  </a:schemeClr>
-                </a:solidFill>
-              </a:rPr>
-              <a:t>Session 10: </a:t>
-            </a:r>
-            <a:r>
-              <a:rPr lang="en-US" sz="2800" b="1" dirty="0" smtClean="0">
-                <a:solidFill>
-                  <a:srgbClr val="00B050"/>
-                </a:solidFill>
-              </a:rPr>
-              <a:t>Workshop – </a:t>
-            </a:r>
-            <a:r>
-              <a:rPr lang="en-US" sz="2800" b="1" dirty="0" err="1" smtClean="0">
-                <a:solidFill>
-                  <a:srgbClr val="00B050"/>
-                </a:solidFill>
-              </a:rPr>
-              <a:t>TensorFlow</a:t>
-            </a:r>
-            <a:endParaRPr lang="en-US" sz="2800" b="1" dirty="0" smtClean="0">
-              <a:solidFill>
-                <a:srgbClr val="00B050"/>
-              </a:solidFill>
-            </a:endParaRPr>
-          </a:p>
-          <a:p>
-            <a:endParaRPr lang="en-US" sz="2800" dirty="0"/>
-          </a:p>
-          <a:p>
-            <a:r>
-              <a:rPr lang="en-US" sz="1600" dirty="0"/>
-              <a:t>	This workshop will cover programming in </a:t>
-            </a:r>
-            <a:r>
-              <a:rPr lang="en-US" sz="1600" dirty="0" err="1" smtClean="0"/>
-              <a:t>TensorFlow</a:t>
-            </a:r>
-            <a:r>
-              <a:rPr lang="en-US" sz="1600" dirty="0" smtClean="0"/>
-              <a:t>, covering the concepts of Design and Run,</a:t>
-            </a:r>
-          </a:p>
-          <a:p>
-            <a:r>
-              <a:rPr lang="en-US" sz="1600" dirty="0"/>
-              <a:t>	</a:t>
-            </a:r>
-            <a:r>
-              <a:rPr lang="en-US" sz="1600" dirty="0" smtClean="0"/>
-              <a:t>syntax, and common approaches and design techniques. (Julio Barros, MS)</a:t>
-            </a:r>
           </a:p>
         </p:txBody>
       </p:sp>
     </p:spTree>
     <p:extLst>
       <p:ext uri="{BB962C8B-B14F-4D97-AF65-F5344CB8AC3E}">
-        <p14:creationId xmlns:p14="http://schemas.microsoft.com/office/powerpoint/2010/main" val="2047582178"/>
+        <p14:creationId xmlns:p14="http://schemas.microsoft.com/office/powerpoint/2010/main" val="1196466078"/>
       </p:ext>
     </p:extLst>
   </p:cSld>

</xml_diff>